<commit_message>
added Build vs. Buy slide
</commit_message>
<xml_diff>
--- a/resources/Innovation Day - Property Monitoring Kit.pptx
+++ b/resources/Innovation Day - Property Monitoring Kit.pptx
@@ -5,30 +5,31 @@
     <p:sldMasterId id="2147483689" r:id="rId1"/>
   </p:sldMasterIdLst>
   <p:notesMasterIdLst>
-    <p:notesMasterId r:id="rId20"/>
+    <p:notesMasterId r:id="rId21"/>
   </p:notesMasterIdLst>
   <p:handoutMasterIdLst>
-    <p:handoutMasterId r:id="rId21"/>
+    <p:handoutMasterId r:id="rId22"/>
   </p:handoutMasterIdLst>
   <p:sldIdLst>
     <p:sldId id="256" r:id="rId2"/>
     <p:sldId id="284" r:id="rId3"/>
     <p:sldId id="298" r:id="rId4"/>
     <p:sldId id="297" r:id="rId5"/>
-    <p:sldId id="296" r:id="rId6"/>
+    <p:sldId id="310" r:id="rId6"/>
     <p:sldId id="286" r:id="rId7"/>
-    <p:sldId id="300" r:id="rId8"/>
-    <p:sldId id="288" r:id="rId9"/>
-    <p:sldId id="304" r:id="rId10"/>
-    <p:sldId id="303" r:id="rId11"/>
-    <p:sldId id="305" r:id="rId12"/>
-    <p:sldId id="306" r:id="rId13"/>
-    <p:sldId id="307" r:id="rId14"/>
-    <p:sldId id="301" r:id="rId15"/>
-    <p:sldId id="291" r:id="rId16"/>
-    <p:sldId id="292" r:id="rId17"/>
-    <p:sldId id="293" r:id="rId18"/>
-    <p:sldId id="294" r:id="rId19"/>
+    <p:sldId id="308" r:id="rId8"/>
+    <p:sldId id="300" r:id="rId9"/>
+    <p:sldId id="288" r:id="rId10"/>
+    <p:sldId id="304" r:id="rId11"/>
+    <p:sldId id="303" r:id="rId12"/>
+    <p:sldId id="305" r:id="rId13"/>
+    <p:sldId id="306" r:id="rId14"/>
+    <p:sldId id="307" r:id="rId15"/>
+    <p:sldId id="301" r:id="rId16"/>
+    <p:sldId id="291" r:id="rId17"/>
+    <p:sldId id="292" r:id="rId18"/>
+    <p:sldId id="293" r:id="rId19"/>
+    <p:sldId id="294" r:id="rId20"/>
   </p:sldIdLst>
   <p:sldSz cx="12192000" cy="6858000"/>
   <p:notesSz cx="7023100" cy="9309100"/>
@@ -217,7 +218,7 @@
           <a:p>
             <a:fld id="{21D77433-D912-44EC-8502-E455187A804F}" type="datetimeFigureOut">
               <a:rPr lang="en-US" smtClean="0"/>
-              <a:t>9/24/18</a:t>
+              <a:t>10/27/2018</a:t>
             </a:fld>
             <a:endParaRPr lang="en-US"/>
           </a:p>
@@ -383,7 +384,7 @@
           <a:p>
             <a:fld id="{44F6AB8C-C820-4873-8D20-0E9DC031BD70}" type="datetimeFigureOut">
               <a:rPr lang="en-US" smtClean="0"/>
-              <a:t>9/24/18</a:t>
+              <a:t>10/27/2018</a:t>
             </a:fld>
             <a:endParaRPr lang="en-US"/>
           </a:p>
@@ -923,7 +924,7 @@
           <a:p>
             <a:fld id="{D61390C7-9EFE-4505-8D70-243612A87A08}" type="datetime1">
               <a:rPr lang="en-US" smtClean="0"/>
-              <a:t>9/24/18</a:t>
+              <a:t>10/27/2018</a:t>
             </a:fld>
             <a:endParaRPr lang="en-US"/>
           </a:p>
@@ -1261,7 +1262,7 @@
           <a:p>
             <a:fld id="{844B3533-FB52-4865-8C82-0DA975B0A6AA}" type="datetime1">
               <a:rPr lang="en-US" smtClean="0"/>
-              <a:t>9/24/18</a:t>
+              <a:t>10/27/2018</a:t>
             </a:fld>
             <a:endParaRPr lang="en-US"/>
           </a:p>
@@ -1663,7 +1664,7 @@
           <a:p>
             <a:fld id="{844B3533-FB52-4865-8C82-0DA975B0A6AA}" type="datetime1">
               <a:rPr lang="en-US" smtClean="0"/>
-              <a:t>9/24/18</a:t>
+              <a:t>10/27/2018</a:t>
             </a:fld>
             <a:endParaRPr lang="en-US"/>
           </a:p>
@@ -2000,7 +2001,7 @@
           <a:p>
             <a:fld id="{844B3533-FB52-4865-8C82-0DA975B0A6AA}" type="datetime1">
               <a:rPr lang="en-US" smtClean="0"/>
-              <a:t>9/24/18</a:t>
+              <a:t>10/27/2018</a:t>
             </a:fld>
             <a:endParaRPr lang="en-US"/>
           </a:p>
@@ -2321,7 +2322,7 @@
           <a:p>
             <a:fld id="{844B3533-FB52-4865-8C82-0DA975B0A6AA}" type="datetime1">
               <a:rPr lang="en-US" smtClean="0"/>
-              <a:t>9/24/18</a:t>
+              <a:t>10/27/2018</a:t>
             </a:fld>
             <a:endParaRPr lang="en-US"/>
           </a:p>
@@ -2718,7 +2719,7 @@
           <a:p>
             <a:fld id="{844B3533-FB52-4865-8C82-0DA975B0A6AA}" type="datetime1">
               <a:rPr lang="en-US" smtClean="0"/>
-              <a:t>9/24/18</a:t>
+              <a:t>10/27/2018</a:t>
             </a:fld>
             <a:endParaRPr lang="en-US"/>
           </a:p>
@@ -2976,7 +2977,7 @@
           <a:p>
             <a:fld id="{387FAA98-CD57-40DB-8E3C-683296458C76}" type="datetime1">
               <a:rPr lang="en-US" smtClean="0"/>
-              <a:t>9/24/18</a:t>
+              <a:t>10/27/2018</a:t>
             </a:fld>
             <a:endParaRPr lang="en-US"/>
           </a:p>
@@ -3238,7 +3239,7 @@
           <a:p>
             <a:fld id="{F3454765-2CF4-464C-9FAF-F5E0A5A955F7}" type="datetime1">
               <a:rPr lang="en-US" smtClean="0"/>
-              <a:t>9/24/18</a:t>
+              <a:t>10/27/2018</a:t>
             </a:fld>
             <a:endParaRPr lang="en-US"/>
           </a:p>
@@ -3500,7 +3501,7 @@
           <a:p>
             <a:fld id="{5620BCD8-EAC9-400D-8F9F-13D2EB503D50}" type="datetime1">
               <a:rPr lang="en-US" smtClean="0"/>
-              <a:t>9/24/18</a:t>
+              <a:t>10/27/2018</a:t>
             </a:fld>
             <a:endParaRPr lang="en-US"/>
           </a:p>
@@ -3829,7 +3830,7 @@
           <a:p>
             <a:fld id="{684656F5-09F7-4839-98AD-A47FD76FD43E}" type="datetime1">
               <a:rPr lang="en-US" smtClean="0"/>
-              <a:t>9/24/18</a:t>
+              <a:t>10/27/2018</a:t>
             </a:fld>
             <a:endParaRPr lang="en-US"/>
           </a:p>
@@ -4152,7 +4153,7 @@
           <a:p>
             <a:fld id="{6913BE8F-5F29-4D22-9F75-8D75D45E6D40}" type="datetime1">
               <a:rPr lang="en-US" smtClean="0"/>
-              <a:t>9/24/18</a:t>
+              <a:t>10/27/2018</a:t>
             </a:fld>
             <a:endParaRPr lang="en-US"/>
           </a:p>
@@ -4609,7 +4610,7 @@
           <a:p>
             <a:fld id="{A1255B3B-1A05-4AAB-B287-1ABF39E04950}" type="datetime1">
               <a:rPr lang="en-US" smtClean="0"/>
-              <a:t>9/24/18</a:t>
+              <a:t>10/27/2018</a:t>
             </a:fld>
             <a:endParaRPr lang="en-US"/>
           </a:p>
@@ -4814,7 +4815,7 @@
           <a:p>
             <a:fld id="{CAABEDC0-377B-4ECC-B18E-FED9D9162ED6}" type="datetime1">
               <a:rPr lang="en-US" smtClean="0"/>
-              <a:t>9/24/18</a:t>
+              <a:t>10/27/2018</a:t>
             </a:fld>
             <a:endParaRPr lang="en-US"/>
           </a:p>
@@ -4991,7 +4992,7 @@
           <a:p>
             <a:fld id="{2036DE6C-B232-4C3D-B304-2B209FF7DBF9}" type="datetime1">
               <a:rPr lang="en-US" smtClean="0"/>
-              <a:t>9/24/18</a:t>
+              <a:t>10/27/2018</a:t>
             </a:fld>
             <a:endParaRPr lang="en-US"/>
           </a:p>
@@ -5324,7 +5325,7 @@
           <a:p>
             <a:fld id="{F2737266-4FC9-48E2-840B-E23C3AF66F8B}" type="datetime1">
               <a:rPr lang="en-US" smtClean="0"/>
-              <a:t>9/24/18</a:t>
+              <a:t>10/27/2018</a:t>
             </a:fld>
             <a:endParaRPr lang="en-US"/>
           </a:p>
@@ -5669,7 +5670,7 @@
           <a:p>
             <a:fld id="{5E2833C8-8D57-493A-B6B1-8E3B0004214D}" type="datetime1">
               <a:rPr lang="en-US" smtClean="0"/>
-              <a:t>9/24/18</a:t>
+              <a:t>10/27/2018</a:t>
             </a:fld>
             <a:endParaRPr lang="en-US"/>
           </a:p>
@@ -7786,7 +7787,7 @@
           <a:p>
             <a:fld id="{844B3533-FB52-4865-8C82-0DA975B0A6AA}" type="datetime1">
               <a:rPr lang="en-US" smtClean="0"/>
-              <a:t>9/24/18</a:t>
+              <a:t>10/27/2018</a:t>
             </a:fld>
             <a:endParaRPr lang="en-US"/>
           </a:p>
@@ -8547,6 +8548,238 @@
             <a:pPr algn="r"/>
             <a:r>
               <a:rPr lang="en-US" dirty="0"/>
+              <a:t>Appendix 2: Arduino Kit Cost </a:t>
+            </a:r>
+          </a:p>
+        </p:txBody>
+      </p:sp>
+      <p:sp>
+        <p:nvSpPr>
+          <p:cNvPr id="5" name="Footer Placeholder 3"/>
+          <p:cNvSpPr txBox="1">
+            <a:spLocks/>
+          </p:cNvSpPr>
+          <p:nvPr/>
+        </p:nvSpPr>
+        <p:spPr>
+          <a:xfrm>
+            <a:off x="2741612" y="6473736"/>
+            <a:ext cx="7619999" cy="365125"/>
+          </a:xfrm>
+          <a:prstGeom prst="rect">
+            <a:avLst/>
+          </a:prstGeom>
+        </p:spPr>
+        <p:txBody>
+          <a:bodyPr vert="horz" lIns="91440" tIns="45720" rIns="91440" bIns="45720" rtlCol="0" anchor="ctr"/>
+          <a:lstStyle>
+            <a:defPPr>
+              <a:defRPr lang="en-US"/>
+            </a:defPPr>
+            <a:lvl1pPr marL="0" algn="l" defTabSz="914400" rtl="0" eaLnBrk="1" latinLnBrk="0" hangingPunct="1">
+              <a:defRPr sz="900" kern="1200">
+                <a:solidFill>
+                  <a:schemeClr val="tx1">
+                    <a:tint val="75000"/>
+                  </a:schemeClr>
+                </a:solidFill>
+                <a:latin typeface="+mn-lt"/>
+                <a:ea typeface="+mn-ea"/>
+                <a:cs typeface="+mn-cs"/>
+              </a:defRPr>
+            </a:lvl1pPr>
+            <a:lvl2pPr marL="457200" algn="l" defTabSz="914400" rtl="0" eaLnBrk="1" latinLnBrk="0" hangingPunct="1">
+              <a:defRPr sz="1800" kern="1200">
+                <a:solidFill>
+                  <a:schemeClr val="tx1"/>
+                </a:solidFill>
+                <a:latin typeface="+mn-lt"/>
+                <a:ea typeface="+mn-ea"/>
+                <a:cs typeface="+mn-cs"/>
+              </a:defRPr>
+            </a:lvl2pPr>
+            <a:lvl3pPr marL="914400" algn="l" defTabSz="914400" rtl="0" eaLnBrk="1" latinLnBrk="0" hangingPunct="1">
+              <a:defRPr sz="1800" kern="1200">
+                <a:solidFill>
+                  <a:schemeClr val="tx1"/>
+                </a:solidFill>
+                <a:latin typeface="+mn-lt"/>
+                <a:ea typeface="+mn-ea"/>
+                <a:cs typeface="+mn-cs"/>
+              </a:defRPr>
+            </a:lvl3pPr>
+            <a:lvl4pPr marL="1371600" algn="l" defTabSz="914400" rtl="0" eaLnBrk="1" latinLnBrk="0" hangingPunct="1">
+              <a:defRPr sz="1800" kern="1200">
+                <a:solidFill>
+                  <a:schemeClr val="tx1"/>
+                </a:solidFill>
+                <a:latin typeface="+mn-lt"/>
+                <a:ea typeface="+mn-ea"/>
+                <a:cs typeface="+mn-cs"/>
+              </a:defRPr>
+            </a:lvl4pPr>
+            <a:lvl5pPr marL="1828800" algn="l" defTabSz="914400" rtl="0" eaLnBrk="1" latinLnBrk="0" hangingPunct="1">
+              <a:defRPr sz="1800" kern="1200">
+                <a:solidFill>
+                  <a:schemeClr val="tx1"/>
+                </a:solidFill>
+                <a:latin typeface="+mn-lt"/>
+                <a:ea typeface="+mn-ea"/>
+                <a:cs typeface="+mn-cs"/>
+              </a:defRPr>
+            </a:lvl5pPr>
+            <a:lvl6pPr marL="2286000" algn="l" defTabSz="914400" rtl="0" eaLnBrk="1" latinLnBrk="0" hangingPunct="1">
+              <a:defRPr sz="1800" kern="1200">
+                <a:solidFill>
+                  <a:schemeClr val="tx1"/>
+                </a:solidFill>
+                <a:latin typeface="+mn-lt"/>
+                <a:ea typeface="+mn-ea"/>
+                <a:cs typeface="+mn-cs"/>
+              </a:defRPr>
+            </a:lvl6pPr>
+            <a:lvl7pPr marL="2743200" algn="l" defTabSz="914400" rtl="0" eaLnBrk="1" latinLnBrk="0" hangingPunct="1">
+              <a:defRPr sz="1800" kern="1200">
+                <a:solidFill>
+                  <a:schemeClr val="tx1"/>
+                </a:solidFill>
+                <a:latin typeface="+mn-lt"/>
+                <a:ea typeface="+mn-ea"/>
+                <a:cs typeface="+mn-cs"/>
+              </a:defRPr>
+            </a:lvl7pPr>
+            <a:lvl8pPr marL="3200400" algn="l" defTabSz="914400" rtl="0" eaLnBrk="1" latinLnBrk="0" hangingPunct="1">
+              <a:defRPr sz="1800" kern="1200">
+                <a:solidFill>
+                  <a:schemeClr val="tx1"/>
+                </a:solidFill>
+                <a:latin typeface="+mn-lt"/>
+                <a:ea typeface="+mn-ea"/>
+                <a:cs typeface="+mn-cs"/>
+              </a:defRPr>
+            </a:lvl8pPr>
+            <a:lvl9pPr marL="3657600" algn="l" defTabSz="914400" rtl="0" eaLnBrk="1" latinLnBrk="0" hangingPunct="1">
+              <a:defRPr sz="1800" kern="1200">
+                <a:solidFill>
+                  <a:schemeClr val="tx1"/>
+                </a:solidFill>
+                <a:latin typeface="+mn-lt"/>
+                <a:ea typeface="+mn-ea"/>
+                <a:cs typeface="+mn-cs"/>
+              </a:defRPr>
+            </a:lvl9pPr>
+          </a:lstStyle>
+          <a:p>
+            <a:r>
+              <a:rPr lang="en-US" dirty="0">
+                <a:solidFill>
+                  <a:schemeClr val="bg1">
+                    <a:lumMod val="65000"/>
+                  </a:schemeClr>
+                </a:solidFill>
+              </a:rPr>
+              <a:t>Innovation Day | August 23</a:t>
+            </a:r>
+            <a:r>
+              <a:rPr lang="en-US" baseline="30000" dirty="0">
+                <a:solidFill>
+                  <a:schemeClr val="bg1">
+                    <a:lumMod val="65000"/>
+                  </a:schemeClr>
+                </a:solidFill>
+              </a:rPr>
+              <a:t>rd</a:t>
+            </a:r>
+            <a:r>
+              <a:rPr lang="en-US" dirty="0">
+                <a:solidFill>
+                  <a:schemeClr val="bg1">
+                    <a:lumMod val="65000"/>
+                  </a:schemeClr>
+                </a:solidFill>
+              </a:rPr>
+              <a:t> 2018</a:t>
+            </a:r>
+          </a:p>
+        </p:txBody>
+      </p:sp>
+      <p:pic>
+        <p:nvPicPr>
+          <p:cNvPr id="3" name="Content Placeholder 2"/>
+          <p:cNvPicPr>
+            <a:picLocks noGrp="1" noChangeAspect="1"/>
+          </p:cNvPicPr>
+          <p:nvPr>
+            <p:ph idx="1"/>
+          </p:nvPr>
+        </p:nvPicPr>
+        <p:blipFill>
+          <a:blip r:embed="rId2">
+            <a:extLst>
+              <a:ext uri="{28A0092B-C50C-407E-A947-70E740481C1C}">
+                <a14:useLocalDpi xmlns:a14="http://schemas.microsoft.com/office/drawing/2010/main" val="0"/>
+              </a:ext>
+            </a:extLst>
+          </a:blip>
+          <a:stretch>
+            <a:fillRect/>
+          </a:stretch>
+        </p:blipFill>
+        <p:spPr>
+          <a:xfrm>
+            <a:off x="2798379" y="1622631"/>
+            <a:ext cx="8706233" cy="4918347"/>
+          </a:xfrm>
+        </p:spPr>
+      </p:pic>
+    </p:spTree>
+    <p:extLst>
+      <p:ext uri="{BB962C8B-B14F-4D97-AF65-F5344CB8AC3E}">
+        <p14:creationId xmlns:p14="http://schemas.microsoft.com/office/powerpoint/2010/main" val="3643360109"/>
+      </p:ext>
+    </p:extLst>
+  </p:cSld>
+  <p:clrMapOvr>
+    <a:masterClrMapping/>
+  </p:clrMapOvr>
+</p:sld>
+</file>
+
+<file path=ppt/slides/slide11.xml><?xml version="1.0" encoding="utf-8"?>
+<p:sld xmlns:a="http://schemas.openxmlformats.org/drawingml/2006/main" xmlns:r="http://schemas.openxmlformats.org/officeDocument/2006/relationships" xmlns:p="http://schemas.openxmlformats.org/presentationml/2006/main">
+  <p:cSld>
+    <p:spTree>
+      <p:nvGrpSpPr>
+        <p:cNvPr id="1" name=""/>
+        <p:cNvGrpSpPr/>
+        <p:nvPr/>
+      </p:nvGrpSpPr>
+      <p:grpSpPr>
+        <a:xfrm>
+          <a:off x="0" y="0"/>
+          <a:ext cx="0" cy="0"/>
+          <a:chOff x="0" y="0"/>
+          <a:chExt cx="0" cy="0"/>
+        </a:xfrm>
+      </p:grpSpPr>
+      <p:sp>
+        <p:nvSpPr>
+          <p:cNvPr id="2" name="Title 1"/>
+          <p:cNvSpPr>
+            <a:spLocks noGrp="1"/>
+          </p:cNvSpPr>
+          <p:nvPr>
+            <p:ph type="title"/>
+          </p:nvPr>
+        </p:nvSpPr>
+        <p:spPr/>
+        <p:txBody>
+          <a:bodyPr/>
+          <a:lstStyle/>
+          <a:p>
+            <a:pPr algn="r"/>
+            <a:r>
+              <a:rPr lang="en-US" dirty="0"/>
               <a:t>Appendix 3: Raspberry Pi Kit Cost</a:t>
             </a:r>
           </a:p>
@@ -8744,7 +8977,7 @@
 </p:sld>
 </file>
 
-<file path=ppt/slides/slide11.xml><?xml version="1.0" encoding="utf-8"?>
+<file path=ppt/slides/slide12.xml><?xml version="1.0" encoding="utf-8"?>
 <p:sld xmlns:a="http://schemas.openxmlformats.org/drawingml/2006/main" xmlns:r="http://schemas.openxmlformats.org/officeDocument/2006/relationships" xmlns:p="http://schemas.openxmlformats.org/presentationml/2006/main">
   <p:cSld>
     <p:spTree>
@@ -8976,7 +9209,7 @@
 </p:sld>
 </file>
 
-<file path=ppt/slides/slide12.xml><?xml version="1.0" encoding="utf-8"?>
+<file path=ppt/slides/slide13.xml><?xml version="1.0" encoding="utf-8"?>
 <p:sld xmlns:a="http://schemas.openxmlformats.org/drawingml/2006/main" xmlns:r="http://schemas.openxmlformats.org/officeDocument/2006/relationships" xmlns:p="http://schemas.openxmlformats.org/presentationml/2006/main">
   <p:cSld>
     <p:spTree>
@@ -9279,7 +9512,7 @@
 </p:sld>
 </file>
 
-<file path=ppt/slides/slide13.xml><?xml version="1.0" encoding="utf-8"?>
+<file path=ppt/slides/slide14.xml><?xml version="1.0" encoding="utf-8"?>
 <p:sld xmlns:a="http://schemas.openxmlformats.org/drawingml/2006/main" xmlns:r="http://schemas.openxmlformats.org/officeDocument/2006/relationships" xmlns:p="http://schemas.openxmlformats.org/presentationml/2006/main">
   <p:cSld>
     <p:spTree>
@@ -9505,6 +9738,10 @@
               </a:rPr>
               <a:t>https://aws.amazon.com/elasticsearch-service/pricing/</a:t>
             </a:r>
+            <a:r>
+              <a:rPr lang="en-US" dirty="0"/>
+              <a:t/>
+            </a:r>
             <a:br>
               <a:rPr lang="en-US" dirty="0"/>
             </a:br>
@@ -9513,6 +9750,10 @@
                 <a:hlinkClick r:id="rId3"/>
               </a:rPr>
               <a:t>https://docs.aws.amazon.com/elasticsearch-service/latest/developerguide/aes-limits.html</a:t>
+            </a:r>
+            <a:r>
+              <a:rPr lang="en-US" dirty="0"/>
+              <a:t/>
             </a:r>
             <a:br>
               <a:rPr lang="en-US" dirty="0"/>
@@ -9635,7 +9876,7 @@
 </p:sld>
 </file>
 
-<file path=ppt/slides/slide14.xml><?xml version="1.0" encoding="utf-8"?>
+<file path=ppt/slides/slide15.xml><?xml version="1.0" encoding="utf-8"?>
 <p:sld xmlns:a="http://schemas.openxmlformats.org/drawingml/2006/main" xmlns:r="http://schemas.openxmlformats.org/officeDocument/2006/relationships" xmlns:p="http://schemas.openxmlformats.org/presentationml/2006/main">
   <p:cSld>
     <p:spTree>
@@ -9864,7 +10105,7 @@
 </p:sld>
 </file>
 
-<file path=ppt/slides/slide15.xml><?xml version="1.0" encoding="utf-8"?>
+<file path=ppt/slides/slide16.xml><?xml version="1.0" encoding="utf-8"?>
 <p:sld xmlns:a="http://schemas.openxmlformats.org/drawingml/2006/main" xmlns:r="http://schemas.openxmlformats.org/officeDocument/2006/relationships" xmlns:p="http://schemas.openxmlformats.org/presentationml/2006/main">
   <p:cSld>
     <p:spTree>
@@ -10091,7 +10332,7 @@
 </p:sld>
 </file>
 
-<file path=ppt/slides/slide16.xml><?xml version="1.0" encoding="utf-8"?>
+<file path=ppt/slides/slide17.xml><?xml version="1.0" encoding="utf-8"?>
 <p:sld xmlns:a="http://schemas.openxmlformats.org/drawingml/2006/main" xmlns:r="http://schemas.openxmlformats.org/officeDocument/2006/relationships" xmlns:p="http://schemas.openxmlformats.org/presentationml/2006/main">
   <p:cSld>
     <p:spTree>
@@ -10318,7 +10559,7 @@
 </p:sld>
 </file>
 
-<file path=ppt/slides/slide17.xml><?xml version="1.0" encoding="utf-8"?>
+<file path=ppt/slides/slide18.xml><?xml version="1.0" encoding="utf-8"?>
 <p:sld xmlns:a="http://schemas.openxmlformats.org/drawingml/2006/main" xmlns:r="http://schemas.openxmlformats.org/officeDocument/2006/relationships" xmlns:p="http://schemas.openxmlformats.org/presentationml/2006/main">
   <p:cSld>
     <p:spTree>
@@ -10545,7 +10786,7 @@
 </p:sld>
 </file>
 
-<file path=ppt/slides/slide18.xml><?xml version="1.0" encoding="utf-8"?>
+<file path=ppt/slides/slide19.xml><?xml version="1.0" encoding="utf-8"?>
 <p:sld xmlns:a="http://schemas.openxmlformats.org/drawingml/2006/main" xmlns:r="http://schemas.openxmlformats.org/officeDocument/2006/relationships" xmlns:p="http://schemas.openxmlformats.org/presentationml/2006/main">
   <p:cSld>
     <p:spTree>
@@ -10867,14 +11108,14 @@
                 <a:gridCol w="1958009">
                   <a:extLst>
                     <a:ext uri="{9D8B030D-6E8A-4147-A177-3AD203B41FA5}">
-                      <a16:colId xmlns:a16="http://schemas.microsoft.com/office/drawing/2014/main" val="20000"/>
+                      <a16:colId xmlns:a16="http://schemas.microsoft.com/office/drawing/2014/main" xmlns="" val="20000"/>
                     </a:ext>
                   </a:extLst>
                 </a:gridCol>
                 <a:gridCol w="6957391">
                   <a:extLst>
                     <a:ext uri="{9D8B030D-6E8A-4147-A177-3AD203B41FA5}">
-                      <a16:colId xmlns:a16="http://schemas.microsoft.com/office/drawing/2014/main" val="20001"/>
+                      <a16:colId xmlns:a16="http://schemas.microsoft.com/office/drawing/2014/main" xmlns="" val="20001"/>
                     </a:ext>
                   </a:extLst>
                 </a:gridCol>
@@ -10922,7 +11163,7 @@
                 </a:tc>
                 <a:extLst>
                   <a:ext uri="{0D108BD9-81ED-4DB2-BD59-A6C34878D82A}">
-                    <a16:rowId xmlns:a16="http://schemas.microsoft.com/office/drawing/2014/main" val="10000"/>
+                    <a16:rowId xmlns:a16="http://schemas.microsoft.com/office/drawing/2014/main" xmlns="" val="10000"/>
                   </a:ext>
                 </a:extLst>
               </a:tr>
@@ -10959,7 +11200,7 @@
                 </a:tc>
                 <a:extLst>
                   <a:ext uri="{0D108BD9-81ED-4DB2-BD59-A6C34878D82A}">
-                    <a16:rowId xmlns:a16="http://schemas.microsoft.com/office/drawing/2014/main" val="10001"/>
+                    <a16:rowId xmlns:a16="http://schemas.microsoft.com/office/drawing/2014/main" xmlns="" val="10001"/>
                   </a:ext>
                 </a:extLst>
               </a:tr>
@@ -11005,7 +11246,7 @@
                 </a:tc>
                 <a:extLst>
                   <a:ext uri="{0D108BD9-81ED-4DB2-BD59-A6C34878D82A}">
-                    <a16:rowId xmlns:a16="http://schemas.microsoft.com/office/drawing/2014/main" val="10002"/>
+                    <a16:rowId xmlns:a16="http://schemas.microsoft.com/office/drawing/2014/main" xmlns="" val="10002"/>
                   </a:ext>
                 </a:extLst>
               </a:tr>
@@ -11051,7 +11292,7 @@
                 </a:tc>
                 <a:extLst>
                   <a:ext uri="{0D108BD9-81ED-4DB2-BD59-A6C34878D82A}">
-                    <a16:rowId xmlns:a16="http://schemas.microsoft.com/office/drawing/2014/main" val="10003"/>
+                    <a16:rowId xmlns:a16="http://schemas.microsoft.com/office/drawing/2014/main" xmlns="" val="10003"/>
                   </a:ext>
                 </a:extLst>
               </a:tr>
@@ -11088,7 +11329,7 @@
                 </a:tc>
                 <a:extLst>
                   <a:ext uri="{0D108BD9-81ED-4DB2-BD59-A6C34878D82A}">
-                    <a16:rowId xmlns:a16="http://schemas.microsoft.com/office/drawing/2014/main" val="10004"/>
+                    <a16:rowId xmlns:a16="http://schemas.microsoft.com/office/drawing/2014/main" xmlns="" val="10004"/>
                   </a:ext>
                 </a:extLst>
               </a:tr>
@@ -11739,9 +11980,10 @@
           <a:p>
             <a:pPr algn="r"/>
             <a:r>
-              <a:rPr lang="en-US" dirty="0"/>
-              <a:t>Property Monitoring Kit: Demo</a:t>
-            </a:r>
+              <a:rPr lang="en-US" dirty="0" smtClean="0"/>
+              <a:t>Build vs. Buy</a:t>
+            </a:r>
+            <a:endParaRPr lang="en-US" dirty="0"/>
           </a:p>
         </p:txBody>
       </p:sp>
@@ -11895,10 +12137,1299 @@
           </a:p>
         </p:txBody>
       </p:sp>
+      <p:graphicFrame>
+        <p:nvGraphicFramePr>
+          <p:cNvPr id="4" name="Table 3"/>
+          <p:cNvGraphicFramePr>
+            <a:graphicFrameLocks noGrp="1"/>
+          </p:cNvGraphicFramePr>
+          <p:nvPr>
+            <p:extLst>
+              <p:ext uri="{D42A27DB-BD31-4B8C-83A1-F6EECF244321}">
+                <p14:modId xmlns:p14="http://schemas.microsoft.com/office/powerpoint/2010/main" val="3523152016"/>
+              </p:ext>
+            </p:extLst>
+          </p:nvPr>
+        </p:nvGraphicFramePr>
+        <p:xfrm>
+          <a:off x="2919047" y="1394088"/>
+          <a:ext cx="8675076" cy="5049690"/>
+        </p:xfrm>
+        <a:graphic>
+          <a:graphicData uri="http://schemas.openxmlformats.org/drawingml/2006/table">
+            <a:tbl>
+              <a:tblPr firstRow="1" bandRow="1">
+                <a:tableStyleId>{5C22544A-7EE6-4342-B048-85BDC9FD1C3A}</a:tableStyleId>
+              </a:tblPr>
+              <a:tblGrid>
+                <a:gridCol w="2567353"/>
+                <a:gridCol w="3216031"/>
+                <a:gridCol w="2891692"/>
+              </a:tblGrid>
+              <a:tr h="335225">
+                <a:tc>
+                  <a:txBody>
+                    <a:bodyPr/>
+                    <a:lstStyle/>
+                    <a:p>
+                      <a:endParaRPr lang="en-US" dirty="0"/>
+                    </a:p>
+                  </a:txBody>
+                  <a:tcPr>
+                    <a:lnL w="12700" cmpd="sng">
+                      <a:noFill/>
+                    </a:lnL>
+                    <a:lnR w="12700" cmpd="sng">
+                      <a:noFill/>
+                    </a:lnR>
+                    <a:lnT w="12700" cmpd="sng">
+                      <a:noFill/>
+                    </a:lnT>
+                    <a:lnB w="38100" cmpd="sng">
+                      <a:noFill/>
+                    </a:lnB>
+                    <a:lnTlToBr w="12700" cmpd="sng">
+                      <a:noFill/>
+                      <a:prstDash val="solid"/>
+                    </a:lnTlToBr>
+                    <a:lnBlToTr w="12700" cmpd="sng">
+                      <a:noFill/>
+                      <a:prstDash val="solid"/>
+                    </a:lnBlToTr>
+                    <a:noFill/>
+                  </a:tcPr>
+                </a:tc>
+                <a:tc>
+                  <a:txBody>
+                    <a:bodyPr/>
+                    <a:lstStyle/>
+                    <a:p>
+                      <a:pPr algn="ctr"/>
+                      <a:r>
+                        <a:rPr lang="en-US" dirty="0" smtClean="0"/>
+                        <a:t>Fannie</a:t>
+                      </a:r>
+                      <a:r>
+                        <a:rPr lang="en-US" baseline="0" dirty="0" smtClean="0"/>
+                        <a:t> Mae </a:t>
+                      </a:r>
+                      <a:r>
+                        <a:rPr lang="en-US" baseline="0" dirty="0" smtClean="0"/>
+                        <a:t>Custom Kit</a:t>
+                      </a:r>
+                      <a:endParaRPr lang="en-US" dirty="0"/>
+                    </a:p>
+                  </a:txBody>
+                  <a:tcPr>
+                    <a:lnL w="12700" cmpd="sng">
+                      <a:noFill/>
+                    </a:lnL>
+                    <a:lnR w="12700" cmpd="sng">
+                      <a:noFill/>
+                    </a:lnR>
+                    <a:lnT w="12700" cmpd="sng">
+                      <a:noFill/>
+                    </a:lnT>
+                    <a:lnB w="38100" cmpd="sng">
+                      <a:noFill/>
+                    </a:lnB>
+                    <a:lnTlToBr w="12700" cmpd="sng">
+                      <a:noFill/>
+                      <a:prstDash val="solid"/>
+                    </a:lnTlToBr>
+                    <a:lnBlToTr w="12700" cmpd="sng">
+                      <a:noFill/>
+                      <a:prstDash val="solid"/>
+                    </a:lnBlToTr>
+                  </a:tcPr>
+                </a:tc>
+                <a:tc>
+                  <a:txBody>
+                    <a:bodyPr/>
+                    <a:lstStyle/>
+                    <a:p>
+                      <a:pPr algn="ctr"/>
+                      <a:r>
+                        <a:rPr lang="en-US" dirty="0" smtClean="0"/>
+                        <a:t>Off-the-shelf</a:t>
+                      </a:r>
+                      <a:r>
+                        <a:rPr lang="en-US" baseline="0" dirty="0" smtClean="0"/>
+                        <a:t> </a:t>
+                      </a:r>
+                      <a:r>
+                        <a:rPr lang="en-US" dirty="0" smtClean="0"/>
+                        <a:t>(e.g. Ring)</a:t>
+                      </a:r>
+                      <a:endParaRPr lang="en-US" dirty="0"/>
+                    </a:p>
+                  </a:txBody>
+                  <a:tcPr>
+                    <a:lnL w="12700" cmpd="sng">
+                      <a:noFill/>
+                    </a:lnL>
+                    <a:lnR w="12700" cmpd="sng">
+                      <a:noFill/>
+                    </a:lnR>
+                    <a:lnT w="12700" cmpd="sng">
+                      <a:noFill/>
+                    </a:lnT>
+                    <a:lnB w="38100" cmpd="sng">
+                      <a:noFill/>
+                    </a:lnB>
+                    <a:lnTlToBr w="12700" cmpd="sng">
+                      <a:noFill/>
+                      <a:prstDash val="solid"/>
+                    </a:lnTlToBr>
+                    <a:lnBlToTr w="12700" cmpd="sng">
+                      <a:noFill/>
+                      <a:prstDash val="solid"/>
+                    </a:lnBlToTr>
+                  </a:tcPr>
+                </a:tc>
+              </a:tr>
+              <a:tr h="532951">
+                <a:tc>
+                  <a:txBody>
+                    <a:bodyPr/>
+                    <a:lstStyle/>
+                    <a:p>
+                      <a:pPr algn="r"/>
+                      <a:r>
+                        <a:rPr lang="en-US" b="0" dirty="0" smtClean="0">
+                          <a:solidFill>
+                            <a:schemeClr val="accent2">
+                              <a:lumMod val="75000"/>
+                            </a:schemeClr>
+                          </a:solidFill>
+                        </a:rPr>
+                        <a:t>Cost</a:t>
+                      </a:r>
+                      <a:endParaRPr lang="en-US" b="0" dirty="0">
+                        <a:solidFill>
+                          <a:schemeClr val="accent2">
+                            <a:lumMod val="75000"/>
+                          </a:schemeClr>
+                        </a:solidFill>
+                      </a:endParaRPr>
+                    </a:p>
+                  </a:txBody>
+                  <a:tcPr>
+                    <a:lnL w="12700" cmpd="sng">
+                      <a:noFill/>
+                    </a:lnL>
+                    <a:lnR w="12700" cmpd="sng">
+                      <a:noFill/>
+                    </a:lnR>
+                    <a:lnT w="38100" cmpd="sng">
+                      <a:noFill/>
+                    </a:lnT>
+                    <a:lnB w="12700" cmpd="sng">
+                      <a:noFill/>
+                    </a:lnB>
+                    <a:lnTlToBr w="12700" cmpd="sng">
+                      <a:noFill/>
+                      <a:prstDash val="solid"/>
+                    </a:lnTlToBr>
+                    <a:lnBlToTr w="12700" cmpd="sng">
+                      <a:noFill/>
+                      <a:prstDash val="solid"/>
+                    </a:lnBlToTr>
+                    <a:noFill/>
+                  </a:tcPr>
+                </a:tc>
+                <a:tc>
+                  <a:txBody>
+                    <a:bodyPr/>
+                    <a:lstStyle/>
+                    <a:p>
+                      <a:pPr algn="ctr"/>
+                      <a:r>
+                        <a:rPr lang="en-US" dirty="0" smtClean="0">
+                          <a:solidFill>
+                            <a:schemeClr val="tx1"/>
+                          </a:solidFill>
+                        </a:rPr>
+                        <a:t>$89.63 per Kit</a:t>
+                      </a:r>
+                      <a:endParaRPr lang="en-US" dirty="0">
+                        <a:solidFill>
+                          <a:schemeClr val="tx1"/>
+                        </a:solidFill>
+                      </a:endParaRPr>
+                    </a:p>
+                  </a:txBody>
+                  <a:tcPr>
+                    <a:lnL w="12700" cmpd="sng">
+                      <a:noFill/>
+                    </a:lnL>
+                    <a:lnR w="12700" cmpd="sng">
+                      <a:noFill/>
+                    </a:lnR>
+                    <a:lnT w="38100" cmpd="sng">
+                      <a:noFill/>
+                    </a:lnT>
+                    <a:lnB w="12700" cmpd="sng">
+                      <a:noFill/>
+                    </a:lnB>
+                    <a:lnTlToBr w="12700" cmpd="sng">
+                      <a:noFill/>
+                      <a:prstDash val="solid"/>
+                    </a:lnTlToBr>
+                    <a:lnBlToTr w="12700" cmpd="sng">
+                      <a:noFill/>
+                      <a:prstDash val="solid"/>
+                    </a:lnBlToTr>
+                  </a:tcPr>
+                </a:tc>
+                <a:tc>
+                  <a:txBody>
+                    <a:bodyPr/>
+                    <a:lstStyle/>
+                    <a:p>
+                      <a:pPr algn="ctr"/>
+                      <a:r>
+                        <a:rPr lang="en-US" dirty="0" smtClean="0">
+                          <a:solidFill>
+                            <a:schemeClr val="tx1"/>
+                          </a:solidFill>
+                        </a:rPr>
+                        <a:t>$175 per Camera</a:t>
+                      </a:r>
+                      <a:endParaRPr lang="en-US" dirty="0">
+                        <a:solidFill>
+                          <a:schemeClr val="tx1"/>
+                        </a:solidFill>
+                      </a:endParaRPr>
+                    </a:p>
+                  </a:txBody>
+                  <a:tcPr>
+                    <a:lnL w="12700" cmpd="sng">
+                      <a:noFill/>
+                    </a:lnL>
+                    <a:lnR w="12700" cmpd="sng">
+                      <a:noFill/>
+                    </a:lnR>
+                    <a:lnT w="38100" cmpd="sng">
+                      <a:noFill/>
+                    </a:lnT>
+                    <a:lnB w="12700" cmpd="sng">
+                      <a:noFill/>
+                    </a:lnB>
+                    <a:lnTlToBr w="12700" cmpd="sng">
+                      <a:noFill/>
+                      <a:prstDash val="solid"/>
+                    </a:lnTlToBr>
+                    <a:lnBlToTr w="12700" cmpd="sng">
+                      <a:noFill/>
+                      <a:prstDash val="solid"/>
+                    </a:lnBlToTr>
+                  </a:tcPr>
+                </a:tc>
+              </a:tr>
+              <a:tr h="525352">
+                <a:tc>
+                  <a:txBody>
+                    <a:bodyPr/>
+                    <a:lstStyle/>
+                    <a:p>
+                      <a:pPr algn="r"/>
+                      <a:r>
+                        <a:rPr lang="en-US" b="0" dirty="0" smtClean="0">
+                          <a:solidFill>
+                            <a:schemeClr val="accent2">
+                              <a:lumMod val="75000"/>
+                            </a:schemeClr>
+                          </a:solidFill>
+                        </a:rPr>
+                        <a:t>Sensors</a:t>
+                      </a:r>
+                      <a:endParaRPr lang="en-US" b="0" dirty="0">
+                        <a:solidFill>
+                          <a:schemeClr val="accent2">
+                            <a:lumMod val="75000"/>
+                          </a:schemeClr>
+                        </a:solidFill>
+                      </a:endParaRPr>
+                    </a:p>
+                  </a:txBody>
+                  <a:tcPr>
+                    <a:lnL w="12700" cmpd="sng">
+                      <a:noFill/>
+                    </a:lnL>
+                    <a:lnR w="12700" cmpd="sng">
+                      <a:noFill/>
+                    </a:lnR>
+                    <a:lnT w="12700" cmpd="sng">
+                      <a:noFill/>
+                    </a:lnT>
+                    <a:lnB w="12700" cmpd="sng">
+                      <a:noFill/>
+                    </a:lnB>
+                    <a:lnTlToBr w="12700" cmpd="sng">
+                      <a:noFill/>
+                      <a:prstDash val="solid"/>
+                    </a:lnTlToBr>
+                    <a:lnBlToTr w="12700" cmpd="sng">
+                      <a:noFill/>
+                      <a:prstDash val="solid"/>
+                    </a:lnBlToTr>
+                    <a:noFill/>
+                  </a:tcPr>
+                </a:tc>
+                <a:tc>
+                  <a:txBody>
+                    <a:bodyPr/>
+                    <a:lstStyle/>
+                    <a:p>
+                      <a:pPr marL="0" marR="0" lvl="0" indent="0" algn="ctr" defTabSz="457200" rtl="0" eaLnBrk="1" fontAlgn="auto" latinLnBrk="0" hangingPunct="1">
+                        <a:lnSpc>
+                          <a:spcPct val="100000"/>
+                        </a:lnSpc>
+                        <a:spcBef>
+                          <a:spcPts val="0"/>
+                        </a:spcBef>
+                        <a:spcAft>
+                          <a:spcPts val="0"/>
+                        </a:spcAft>
+                        <a:buClrTx/>
+                        <a:buSzTx/>
+                        <a:buFontTx/>
+                        <a:buNone/>
+                        <a:tabLst/>
+                        <a:defRPr/>
+                      </a:pPr>
+                      <a:r>
+                        <a:rPr lang="en-US" dirty="0" smtClean="0">
+                          <a:solidFill>
+                            <a:schemeClr val="tx1"/>
+                          </a:solidFill>
+                        </a:rPr>
+                        <a:t>Temperature, Heat Index, CO, Smoke, Flame, Sound, Light, Vibration</a:t>
+                      </a:r>
+                    </a:p>
+                  </a:txBody>
+                  <a:tcPr>
+                    <a:lnL w="12700" cmpd="sng">
+                      <a:noFill/>
+                    </a:lnL>
+                    <a:lnR w="12700" cmpd="sng">
+                      <a:noFill/>
+                    </a:lnR>
+                    <a:lnT w="12700" cmpd="sng">
+                      <a:noFill/>
+                    </a:lnT>
+                    <a:lnB w="12700" cmpd="sng">
+                      <a:noFill/>
+                    </a:lnB>
+                    <a:lnTlToBr w="12700" cmpd="sng">
+                      <a:noFill/>
+                      <a:prstDash val="solid"/>
+                    </a:lnTlToBr>
+                    <a:lnBlToTr w="12700" cmpd="sng">
+                      <a:noFill/>
+                      <a:prstDash val="solid"/>
+                    </a:lnBlToTr>
+                  </a:tcPr>
+                </a:tc>
+                <a:tc>
+                  <a:txBody>
+                    <a:bodyPr/>
+                    <a:lstStyle/>
+                    <a:p>
+                      <a:pPr algn="ctr"/>
+                      <a:r>
+                        <a:rPr lang="en-US" dirty="0" smtClean="0">
+                          <a:solidFill>
+                            <a:schemeClr val="tx1"/>
+                          </a:solidFill>
+                        </a:rPr>
+                        <a:t>Motion</a:t>
+                      </a:r>
+                    </a:p>
+                    <a:p>
+                      <a:pPr algn="ctr"/>
+                      <a:r>
+                        <a:rPr lang="en-US" dirty="0" smtClean="0">
+                          <a:solidFill>
+                            <a:schemeClr val="tx1"/>
+                          </a:solidFill>
+                        </a:rPr>
+                        <a:t>(</a:t>
+                      </a:r>
+                      <a:r>
+                        <a:rPr lang="en-US" dirty="0" err="1" smtClean="0">
+                          <a:solidFill>
+                            <a:schemeClr val="tx1"/>
+                          </a:solidFill>
+                        </a:rPr>
+                        <a:t>Flood&amp;Freeze</a:t>
+                      </a:r>
+                      <a:r>
+                        <a:rPr lang="en-US" dirty="0" smtClean="0">
+                          <a:solidFill>
+                            <a:schemeClr val="tx1"/>
+                          </a:solidFill>
+                        </a:rPr>
+                        <a:t> in R&amp;D)</a:t>
+                      </a:r>
+                    </a:p>
+                  </a:txBody>
+                  <a:tcPr>
+                    <a:lnL w="12700" cmpd="sng">
+                      <a:noFill/>
+                    </a:lnL>
+                    <a:lnR w="12700" cmpd="sng">
+                      <a:noFill/>
+                    </a:lnR>
+                    <a:lnT w="12700" cmpd="sng">
+                      <a:noFill/>
+                    </a:lnT>
+                    <a:lnB w="12700" cmpd="sng">
+                      <a:noFill/>
+                    </a:lnB>
+                    <a:lnTlToBr w="12700" cmpd="sng">
+                      <a:noFill/>
+                      <a:prstDash val="solid"/>
+                    </a:lnTlToBr>
+                    <a:lnBlToTr w="12700" cmpd="sng">
+                      <a:noFill/>
+                      <a:prstDash val="solid"/>
+                    </a:lnBlToTr>
+                  </a:tcPr>
+                </a:tc>
+              </a:tr>
+              <a:tr h="464695">
+                <a:tc>
+                  <a:txBody>
+                    <a:bodyPr/>
+                    <a:lstStyle/>
+                    <a:p>
+                      <a:pPr algn="r"/>
+                      <a:r>
+                        <a:rPr lang="en-US" b="0" dirty="0" smtClean="0">
+                          <a:solidFill>
+                            <a:schemeClr val="accent2">
+                              <a:lumMod val="75000"/>
+                            </a:schemeClr>
+                          </a:solidFill>
+                        </a:rPr>
+                        <a:t>Reusable</a:t>
+                      </a:r>
+                      <a:endParaRPr lang="en-US" b="0" dirty="0">
+                        <a:solidFill>
+                          <a:schemeClr val="accent2">
+                            <a:lumMod val="75000"/>
+                          </a:schemeClr>
+                        </a:solidFill>
+                      </a:endParaRPr>
+                    </a:p>
+                  </a:txBody>
+                  <a:tcPr>
+                    <a:lnL w="12700" cmpd="sng">
+                      <a:noFill/>
+                    </a:lnL>
+                    <a:lnR w="12700" cmpd="sng">
+                      <a:noFill/>
+                    </a:lnR>
+                    <a:lnT w="12700" cmpd="sng">
+                      <a:noFill/>
+                    </a:lnT>
+                    <a:lnB w="12700" cmpd="sng">
+                      <a:noFill/>
+                    </a:lnB>
+                    <a:lnTlToBr w="12700" cmpd="sng">
+                      <a:noFill/>
+                      <a:prstDash val="solid"/>
+                    </a:lnTlToBr>
+                    <a:lnBlToTr w="12700" cmpd="sng">
+                      <a:noFill/>
+                      <a:prstDash val="solid"/>
+                    </a:lnBlToTr>
+                    <a:noFill/>
+                  </a:tcPr>
+                </a:tc>
+                <a:tc>
+                  <a:txBody>
+                    <a:bodyPr/>
+                    <a:lstStyle/>
+                    <a:p>
+                      <a:pPr algn="ctr"/>
+                      <a:r>
+                        <a:rPr lang="en-US" dirty="0" smtClean="0">
+                          <a:solidFill>
+                            <a:srgbClr val="00B050"/>
+                          </a:solidFill>
+                        </a:rPr>
+                        <a:t>Yes</a:t>
+                      </a:r>
+                      <a:endParaRPr lang="en-US" dirty="0">
+                        <a:solidFill>
+                          <a:srgbClr val="00B050"/>
+                        </a:solidFill>
+                      </a:endParaRPr>
+                    </a:p>
+                  </a:txBody>
+                  <a:tcPr>
+                    <a:lnL w="12700" cmpd="sng">
+                      <a:noFill/>
+                    </a:lnL>
+                    <a:lnR w="12700" cmpd="sng">
+                      <a:noFill/>
+                    </a:lnR>
+                    <a:lnT w="12700" cmpd="sng">
+                      <a:noFill/>
+                    </a:lnT>
+                    <a:lnB w="12700" cmpd="sng">
+                      <a:noFill/>
+                    </a:lnB>
+                    <a:lnTlToBr w="12700" cmpd="sng">
+                      <a:noFill/>
+                      <a:prstDash val="solid"/>
+                    </a:lnTlToBr>
+                    <a:lnBlToTr w="12700" cmpd="sng">
+                      <a:noFill/>
+                      <a:prstDash val="solid"/>
+                    </a:lnBlToTr>
+                  </a:tcPr>
+                </a:tc>
+                <a:tc>
+                  <a:txBody>
+                    <a:bodyPr/>
+                    <a:lstStyle/>
+                    <a:p>
+                      <a:pPr algn="ctr"/>
+                      <a:r>
+                        <a:rPr lang="en-US" dirty="0" smtClean="0">
+                          <a:solidFill>
+                            <a:srgbClr val="FF0000"/>
+                          </a:solidFill>
+                        </a:rPr>
+                        <a:t>No</a:t>
+                      </a:r>
+                      <a:endParaRPr lang="en-US" dirty="0">
+                        <a:solidFill>
+                          <a:srgbClr val="FF0000"/>
+                        </a:solidFill>
+                      </a:endParaRPr>
+                    </a:p>
+                  </a:txBody>
+                  <a:tcPr>
+                    <a:lnL w="12700" cmpd="sng">
+                      <a:noFill/>
+                    </a:lnL>
+                    <a:lnR w="12700" cmpd="sng">
+                      <a:noFill/>
+                    </a:lnR>
+                    <a:lnT w="12700" cmpd="sng">
+                      <a:noFill/>
+                    </a:lnT>
+                    <a:lnB w="12700" cmpd="sng">
+                      <a:noFill/>
+                    </a:lnB>
+                    <a:lnTlToBr w="12700" cmpd="sng">
+                      <a:noFill/>
+                      <a:prstDash val="solid"/>
+                    </a:lnTlToBr>
+                    <a:lnBlToTr w="12700" cmpd="sng">
+                      <a:noFill/>
+                      <a:prstDash val="solid"/>
+                    </a:lnBlToTr>
+                  </a:tcPr>
+                </a:tc>
+              </a:tr>
+              <a:tr h="532951">
+                <a:tc>
+                  <a:txBody>
+                    <a:bodyPr/>
+                    <a:lstStyle/>
+                    <a:p>
+                      <a:pPr algn="r"/>
+                      <a:r>
+                        <a:rPr lang="en-US" b="0" dirty="0" smtClean="0">
+                          <a:solidFill>
+                            <a:schemeClr val="accent2">
+                              <a:lumMod val="75000"/>
+                            </a:schemeClr>
+                          </a:solidFill>
+                        </a:rPr>
+                        <a:t>Cloud Data</a:t>
+                      </a:r>
+                      <a:endParaRPr lang="en-US" b="0" dirty="0">
+                        <a:solidFill>
+                          <a:schemeClr val="accent2">
+                            <a:lumMod val="75000"/>
+                          </a:schemeClr>
+                        </a:solidFill>
+                      </a:endParaRPr>
+                    </a:p>
+                  </a:txBody>
+                  <a:tcPr>
+                    <a:lnL w="12700" cmpd="sng">
+                      <a:noFill/>
+                    </a:lnL>
+                    <a:lnR w="12700" cmpd="sng">
+                      <a:noFill/>
+                    </a:lnR>
+                    <a:lnT w="12700" cmpd="sng">
+                      <a:noFill/>
+                    </a:lnT>
+                    <a:lnB w="12700" cmpd="sng">
+                      <a:noFill/>
+                    </a:lnB>
+                    <a:lnTlToBr w="12700" cmpd="sng">
+                      <a:noFill/>
+                      <a:prstDash val="solid"/>
+                    </a:lnTlToBr>
+                    <a:lnBlToTr w="12700" cmpd="sng">
+                      <a:noFill/>
+                      <a:prstDash val="solid"/>
+                    </a:lnBlToTr>
+                    <a:noFill/>
+                  </a:tcPr>
+                </a:tc>
+                <a:tc>
+                  <a:txBody>
+                    <a:bodyPr/>
+                    <a:lstStyle/>
+                    <a:p>
+                      <a:pPr algn="ctr"/>
+                      <a:r>
+                        <a:rPr lang="en-US" dirty="0" smtClean="0">
+                          <a:solidFill>
+                            <a:srgbClr val="00B050"/>
+                          </a:solidFill>
+                        </a:rPr>
+                        <a:t>Yes</a:t>
+                      </a:r>
+                      <a:endParaRPr lang="en-US" dirty="0"/>
+                    </a:p>
+                  </a:txBody>
+                  <a:tcPr>
+                    <a:lnL w="12700" cmpd="sng">
+                      <a:noFill/>
+                    </a:lnL>
+                    <a:lnR w="12700" cmpd="sng">
+                      <a:noFill/>
+                    </a:lnR>
+                    <a:lnT w="12700" cmpd="sng">
+                      <a:noFill/>
+                    </a:lnT>
+                    <a:lnB w="12700" cmpd="sng">
+                      <a:noFill/>
+                    </a:lnB>
+                    <a:lnTlToBr w="12700" cmpd="sng">
+                      <a:noFill/>
+                      <a:prstDash val="solid"/>
+                    </a:lnTlToBr>
+                    <a:lnBlToTr w="12700" cmpd="sng">
+                      <a:noFill/>
+                      <a:prstDash val="solid"/>
+                    </a:lnBlToTr>
+                  </a:tcPr>
+                </a:tc>
+                <a:tc>
+                  <a:txBody>
+                    <a:bodyPr/>
+                    <a:lstStyle/>
+                    <a:p>
+                      <a:pPr algn="ctr"/>
+                      <a:r>
+                        <a:rPr lang="en-US" dirty="0" smtClean="0">
+                          <a:solidFill>
+                            <a:srgbClr val="00B050"/>
+                          </a:solidFill>
+                        </a:rPr>
+                        <a:t>Yes</a:t>
+                      </a:r>
+                      <a:endParaRPr lang="en-US" dirty="0"/>
+                    </a:p>
+                  </a:txBody>
+                  <a:tcPr>
+                    <a:lnL w="12700" cmpd="sng">
+                      <a:noFill/>
+                    </a:lnL>
+                    <a:lnR w="12700" cmpd="sng">
+                      <a:noFill/>
+                    </a:lnR>
+                    <a:lnT w="12700" cmpd="sng">
+                      <a:noFill/>
+                    </a:lnT>
+                    <a:lnB w="12700" cmpd="sng">
+                      <a:noFill/>
+                    </a:lnB>
+                    <a:lnTlToBr w="12700" cmpd="sng">
+                      <a:noFill/>
+                      <a:prstDash val="solid"/>
+                    </a:lnTlToBr>
+                    <a:lnBlToTr w="12700" cmpd="sng">
+                      <a:noFill/>
+                      <a:prstDash val="solid"/>
+                    </a:lnBlToTr>
+                  </a:tcPr>
+                </a:tc>
+              </a:tr>
+              <a:tr h="532951">
+                <a:tc>
+                  <a:txBody>
+                    <a:bodyPr/>
+                    <a:lstStyle/>
+                    <a:p>
+                      <a:pPr algn="r"/>
+                      <a:r>
+                        <a:rPr lang="en-US" b="0" dirty="0" smtClean="0">
+                          <a:solidFill>
+                            <a:schemeClr val="accent2">
+                              <a:lumMod val="75000"/>
+                            </a:schemeClr>
+                          </a:solidFill>
+                        </a:rPr>
+                        <a:t>Cloud</a:t>
+                      </a:r>
+                      <a:r>
+                        <a:rPr lang="en-US" b="0" baseline="0" dirty="0" smtClean="0">
+                          <a:solidFill>
+                            <a:schemeClr val="accent2">
+                              <a:lumMod val="75000"/>
+                            </a:schemeClr>
+                          </a:solidFill>
+                        </a:rPr>
+                        <a:t> Aggregation</a:t>
+                      </a:r>
+                      <a:endParaRPr lang="en-US" b="0" dirty="0">
+                        <a:solidFill>
+                          <a:schemeClr val="accent2">
+                            <a:lumMod val="75000"/>
+                          </a:schemeClr>
+                        </a:solidFill>
+                      </a:endParaRPr>
+                    </a:p>
+                  </a:txBody>
+                  <a:tcPr>
+                    <a:lnL w="12700" cmpd="sng">
+                      <a:noFill/>
+                    </a:lnL>
+                    <a:lnR w="12700" cmpd="sng">
+                      <a:noFill/>
+                    </a:lnR>
+                    <a:lnT w="12700" cmpd="sng">
+                      <a:noFill/>
+                    </a:lnT>
+                    <a:lnB w="12700" cmpd="sng">
+                      <a:noFill/>
+                    </a:lnB>
+                    <a:lnTlToBr w="12700" cmpd="sng">
+                      <a:noFill/>
+                      <a:prstDash val="solid"/>
+                    </a:lnTlToBr>
+                    <a:lnBlToTr w="12700" cmpd="sng">
+                      <a:noFill/>
+                      <a:prstDash val="solid"/>
+                    </a:lnBlToTr>
+                    <a:noFill/>
+                  </a:tcPr>
+                </a:tc>
+                <a:tc>
+                  <a:txBody>
+                    <a:bodyPr/>
+                    <a:lstStyle/>
+                    <a:p>
+                      <a:pPr algn="ctr"/>
+                      <a:r>
+                        <a:rPr lang="en-US" dirty="0" smtClean="0">
+                          <a:solidFill>
+                            <a:srgbClr val="00B050"/>
+                          </a:solidFill>
+                        </a:rPr>
+                        <a:t>Yes</a:t>
+                      </a:r>
+                      <a:endParaRPr lang="en-US" dirty="0"/>
+                    </a:p>
+                  </a:txBody>
+                  <a:tcPr>
+                    <a:lnL w="12700" cmpd="sng">
+                      <a:noFill/>
+                    </a:lnL>
+                    <a:lnR w="12700" cmpd="sng">
+                      <a:noFill/>
+                    </a:lnR>
+                    <a:lnT w="12700" cmpd="sng">
+                      <a:noFill/>
+                    </a:lnT>
+                    <a:lnB w="12700" cmpd="sng">
+                      <a:noFill/>
+                    </a:lnB>
+                    <a:lnTlToBr w="12700" cmpd="sng">
+                      <a:noFill/>
+                      <a:prstDash val="solid"/>
+                    </a:lnTlToBr>
+                    <a:lnBlToTr w="12700" cmpd="sng">
+                      <a:noFill/>
+                      <a:prstDash val="solid"/>
+                    </a:lnBlToTr>
+                  </a:tcPr>
+                </a:tc>
+                <a:tc>
+                  <a:txBody>
+                    <a:bodyPr/>
+                    <a:lstStyle/>
+                    <a:p>
+                      <a:pPr algn="ctr"/>
+                      <a:r>
+                        <a:rPr lang="en-US" dirty="0" smtClean="0">
+                          <a:solidFill>
+                            <a:srgbClr val="FF0000"/>
+                          </a:solidFill>
+                        </a:rPr>
+                        <a:t>No</a:t>
+                      </a:r>
+                      <a:endParaRPr lang="en-US" dirty="0"/>
+                    </a:p>
+                  </a:txBody>
+                  <a:tcPr>
+                    <a:lnL w="12700" cmpd="sng">
+                      <a:noFill/>
+                    </a:lnL>
+                    <a:lnR w="12700" cmpd="sng">
+                      <a:noFill/>
+                    </a:lnR>
+                    <a:lnT w="12700" cmpd="sng">
+                      <a:noFill/>
+                    </a:lnT>
+                    <a:lnB w="12700" cmpd="sng">
+                      <a:noFill/>
+                    </a:lnB>
+                    <a:lnTlToBr w="12700" cmpd="sng">
+                      <a:noFill/>
+                      <a:prstDash val="solid"/>
+                    </a:lnTlToBr>
+                    <a:lnBlToTr w="12700" cmpd="sng">
+                      <a:noFill/>
+                      <a:prstDash val="solid"/>
+                    </a:lnBlToTr>
+                  </a:tcPr>
+                </a:tc>
+              </a:tr>
+              <a:tr h="532951">
+                <a:tc>
+                  <a:txBody>
+                    <a:bodyPr/>
+                    <a:lstStyle/>
+                    <a:p>
+                      <a:pPr algn="r"/>
+                      <a:r>
+                        <a:rPr lang="en-US" b="0" dirty="0" smtClean="0">
+                          <a:solidFill>
+                            <a:schemeClr val="accent2">
+                              <a:lumMod val="75000"/>
+                            </a:schemeClr>
+                          </a:solidFill>
+                        </a:rPr>
+                        <a:t>Geolocation Data</a:t>
+                      </a:r>
+                      <a:endParaRPr lang="en-US" b="0" dirty="0">
+                        <a:solidFill>
+                          <a:schemeClr val="accent2">
+                            <a:lumMod val="75000"/>
+                          </a:schemeClr>
+                        </a:solidFill>
+                      </a:endParaRPr>
+                    </a:p>
+                  </a:txBody>
+                  <a:tcPr>
+                    <a:lnL w="12700" cmpd="sng">
+                      <a:noFill/>
+                    </a:lnL>
+                    <a:lnR w="12700" cmpd="sng">
+                      <a:noFill/>
+                    </a:lnR>
+                    <a:lnT w="12700" cmpd="sng">
+                      <a:noFill/>
+                    </a:lnT>
+                    <a:lnB w="12700" cmpd="sng">
+                      <a:noFill/>
+                    </a:lnB>
+                    <a:lnTlToBr w="12700" cmpd="sng">
+                      <a:noFill/>
+                      <a:prstDash val="solid"/>
+                    </a:lnTlToBr>
+                    <a:lnBlToTr w="12700" cmpd="sng">
+                      <a:noFill/>
+                      <a:prstDash val="solid"/>
+                    </a:lnBlToTr>
+                    <a:noFill/>
+                  </a:tcPr>
+                </a:tc>
+                <a:tc>
+                  <a:txBody>
+                    <a:bodyPr/>
+                    <a:lstStyle/>
+                    <a:p>
+                      <a:pPr algn="ctr"/>
+                      <a:r>
+                        <a:rPr lang="en-US" dirty="0" smtClean="0">
+                          <a:solidFill>
+                            <a:srgbClr val="00B050"/>
+                          </a:solidFill>
+                        </a:rPr>
+                        <a:t>Yes</a:t>
+                      </a:r>
+                      <a:endParaRPr lang="en-US" dirty="0"/>
+                    </a:p>
+                  </a:txBody>
+                  <a:tcPr>
+                    <a:lnL w="12700" cmpd="sng">
+                      <a:noFill/>
+                    </a:lnL>
+                    <a:lnR w="12700" cmpd="sng">
+                      <a:noFill/>
+                    </a:lnR>
+                    <a:lnT w="12700" cmpd="sng">
+                      <a:noFill/>
+                    </a:lnT>
+                    <a:lnB w="12700" cmpd="sng">
+                      <a:noFill/>
+                    </a:lnB>
+                    <a:lnTlToBr w="12700" cmpd="sng">
+                      <a:noFill/>
+                      <a:prstDash val="solid"/>
+                    </a:lnTlToBr>
+                    <a:lnBlToTr w="12700" cmpd="sng">
+                      <a:noFill/>
+                      <a:prstDash val="solid"/>
+                    </a:lnBlToTr>
+                  </a:tcPr>
+                </a:tc>
+                <a:tc>
+                  <a:txBody>
+                    <a:bodyPr/>
+                    <a:lstStyle/>
+                    <a:p>
+                      <a:pPr algn="ctr"/>
+                      <a:r>
+                        <a:rPr lang="en-US" dirty="0" smtClean="0">
+                          <a:solidFill>
+                            <a:srgbClr val="FF0000"/>
+                          </a:solidFill>
+                        </a:rPr>
+                        <a:t>No</a:t>
+                      </a:r>
+                      <a:endParaRPr lang="en-US" dirty="0"/>
+                    </a:p>
+                  </a:txBody>
+                  <a:tcPr>
+                    <a:lnL w="12700" cmpd="sng">
+                      <a:noFill/>
+                    </a:lnL>
+                    <a:lnR w="12700" cmpd="sng">
+                      <a:noFill/>
+                    </a:lnR>
+                    <a:lnT w="12700" cmpd="sng">
+                      <a:noFill/>
+                    </a:lnT>
+                    <a:lnB w="12700" cmpd="sng">
+                      <a:noFill/>
+                    </a:lnB>
+                    <a:lnTlToBr w="12700" cmpd="sng">
+                      <a:noFill/>
+                      <a:prstDash val="solid"/>
+                    </a:lnTlToBr>
+                    <a:lnBlToTr w="12700" cmpd="sng">
+                      <a:noFill/>
+                      <a:prstDash val="solid"/>
+                    </a:lnBlToTr>
+                  </a:tcPr>
+                </a:tc>
+              </a:tr>
+              <a:tr h="532951">
+                <a:tc>
+                  <a:txBody>
+                    <a:bodyPr/>
+                    <a:lstStyle/>
+                    <a:p>
+                      <a:pPr algn="r"/>
+                      <a:r>
+                        <a:rPr lang="en-US" b="0" dirty="0" smtClean="0">
+                          <a:solidFill>
+                            <a:schemeClr val="accent2">
+                              <a:lumMod val="75000"/>
+                            </a:schemeClr>
+                          </a:solidFill>
+                        </a:rPr>
+                        <a:t>Data Customization</a:t>
+                      </a:r>
+                      <a:endParaRPr lang="en-US" b="0" dirty="0">
+                        <a:solidFill>
+                          <a:schemeClr val="accent2">
+                            <a:lumMod val="75000"/>
+                          </a:schemeClr>
+                        </a:solidFill>
+                      </a:endParaRPr>
+                    </a:p>
+                  </a:txBody>
+                  <a:tcPr>
+                    <a:lnL w="12700" cmpd="sng">
+                      <a:noFill/>
+                    </a:lnL>
+                    <a:lnR w="12700" cmpd="sng">
+                      <a:noFill/>
+                    </a:lnR>
+                    <a:lnT w="12700" cmpd="sng">
+                      <a:noFill/>
+                    </a:lnT>
+                    <a:lnB w="12700" cmpd="sng">
+                      <a:noFill/>
+                    </a:lnB>
+                    <a:lnTlToBr w="12700" cmpd="sng">
+                      <a:noFill/>
+                      <a:prstDash val="solid"/>
+                    </a:lnTlToBr>
+                    <a:lnBlToTr w="12700" cmpd="sng">
+                      <a:noFill/>
+                      <a:prstDash val="solid"/>
+                    </a:lnBlToTr>
+                    <a:noFill/>
+                  </a:tcPr>
+                </a:tc>
+                <a:tc>
+                  <a:txBody>
+                    <a:bodyPr/>
+                    <a:lstStyle/>
+                    <a:p>
+                      <a:pPr algn="ctr"/>
+                      <a:r>
+                        <a:rPr lang="en-US" dirty="0" smtClean="0">
+                          <a:solidFill>
+                            <a:srgbClr val="00B050"/>
+                          </a:solidFill>
+                        </a:rPr>
+                        <a:t>Yes</a:t>
+                      </a:r>
+                      <a:endParaRPr lang="en-US" dirty="0"/>
+                    </a:p>
+                  </a:txBody>
+                  <a:tcPr>
+                    <a:lnL w="12700" cmpd="sng">
+                      <a:noFill/>
+                    </a:lnL>
+                    <a:lnR w="12700" cmpd="sng">
+                      <a:noFill/>
+                    </a:lnR>
+                    <a:lnT w="12700" cmpd="sng">
+                      <a:noFill/>
+                    </a:lnT>
+                    <a:lnB w="12700" cmpd="sng">
+                      <a:noFill/>
+                    </a:lnB>
+                    <a:lnTlToBr w="12700" cmpd="sng">
+                      <a:noFill/>
+                      <a:prstDash val="solid"/>
+                    </a:lnTlToBr>
+                    <a:lnBlToTr w="12700" cmpd="sng">
+                      <a:noFill/>
+                      <a:prstDash val="solid"/>
+                    </a:lnBlToTr>
+                  </a:tcPr>
+                </a:tc>
+                <a:tc>
+                  <a:txBody>
+                    <a:bodyPr/>
+                    <a:lstStyle/>
+                    <a:p>
+                      <a:pPr algn="ctr"/>
+                      <a:r>
+                        <a:rPr lang="en-US" dirty="0" smtClean="0">
+                          <a:solidFill>
+                            <a:srgbClr val="FF0000"/>
+                          </a:solidFill>
+                        </a:rPr>
+                        <a:t>No</a:t>
+                      </a:r>
+                      <a:endParaRPr lang="en-US" dirty="0"/>
+                    </a:p>
+                  </a:txBody>
+                  <a:tcPr>
+                    <a:lnL w="12700" cmpd="sng">
+                      <a:noFill/>
+                    </a:lnL>
+                    <a:lnR w="12700" cmpd="sng">
+                      <a:noFill/>
+                    </a:lnR>
+                    <a:lnT w="12700" cmpd="sng">
+                      <a:noFill/>
+                    </a:lnT>
+                    <a:lnB w="12700" cmpd="sng">
+                      <a:noFill/>
+                    </a:lnB>
+                    <a:lnTlToBr w="12700" cmpd="sng">
+                      <a:noFill/>
+                      <a:prstDash val="solid"/>
+                    </a:lnTlToBr>
+                    <a:lnBlToTr w="12700" cmpd="sng">
+                      <a:noFill/>
+                      <a:prstDash val="solid"/>
+                    </a:lnBlToTr>
+                  </a:tcPr>
+                </a:tc>
+              </a:tr>
+              <a:tr h="532951">
+                <a:tc>
+                  <a:txBody>
+                    <a:bodyPr/>
+                    <a:lstStyle/>
+                    <a:p>
+                      <a:pPr marL="0" marR="0" lvl="0" indent="0" algn="r" defTabSz="457200" rtl="0" eaLnBrk="1" fontAlgn="auto" latinLnBrk="0" hangingPunct="1">
+                        <a:lnSpc>
+                          <a:spcPct val="100000"/>
+                        </a:lnSpc>
+                        <a:spcBef>
+                          <a:spcPts val="0"/>
+                        </a:spcBef>
+                        <a:spcAft>
+                          <a:spcPts val="0"/>
+                        </a:spcAft>
+                        <a:buClrTx/>
+                        <a:buSzTx/>
+                        <a:buFontTx/>
+                        <a:buNone/>
+                        <a:tabLst/>
+                        <a:defRPr/>
+                      </a:pPr>
+                      <a:r>
+                        <a:rPr lang="en-US" b="0" dirty="0" smtClean="0">
+                          <a:solidFill>
+                            <a:schemeClr val="accent2">
+                              <a:lumMod val="75000"/>
+                            </a:schemeClr>
+                          </a:solidFill>
+                        </a:rPr>
+                        <a:t>HD Video Recording</a:t>
+                      </a:r>
+                    </a:p>
+                    <a:p>
+                      <a:pPr algn="r"/>
+                      <a:endParaRPr lang="en-US" b="0" dirty="0">
+                        <a:solidFill>
+                          <a:schemeClr val="accent2">
+                            <a:lumMod val="75000"/>
+                          </a:schemeClr>
+                        </a:solidFill>
+                      </a:endParaRPr>
+                    </a:p>
+                  </a:txBody>
+                  <a:tcPr>
+                    <a:lnL w="12700" cmpd="sng">
+                      <a:noFill/>
+                    </a:lnL>
+                    <a:lnR w="12700" cmpd="sng">
+                      <a:noFill/>
+                    </a:lnR>
+                    <a:lnT w="12700" cmpd="sng">
+                      <a:noFill/>
+                    </a:lnT>
+                    <a:lnB w="12700" cmpd="sng">
+                      <a:noFill/>
+                    </a:lnB>
+                    <a:lnTlToBr w="12700" cmpd="sng">
+                      <a:noFill/>
+                      <a:prstDash val="solid"/>
+                    </a:lnTlToBr>
+                    <a:lnBlToTr w="12700" cmpd="sng">
+                      <a:noFill/>
+                      <a:prstDash val="solid"/>
+                    </a:lnBlToTr>
+                    <a:noFill/>
+                  </a:tcPr>
+                </a:tc>
+                <a:tc>
+                  <a:txBody>
+                    <a:bodyPr/>
+                    <a:lstStyle/>
+                    <a:p>
+                      <a:pPr algn="ctr"/>
+                      <a:r>
+                        <a:rPr lang="en-US" dirty="0" smtClean="0">
+                          <a:solidFill>
+                            <a:srgbClr val="FF0000"/>
+                          </a:solidFill>
+                        </a:rPr>
+                        <a:t>No</a:t>
+                      </a:r>
+                      <a:endParaRPr lang="en-US" dirty="0"/>
+                    </a:p>
+                  </a:txBody>
+                  <a:tcPr>
+                    <a:lnL w="12700" cmpd="sng">
+                      <a:noFill/>
+                    </a:lnL>
+                    <a:lnR w="12700" cmpd="sng">
+                      <a:noFill/>
+                    </a:lnR>
+                    <a:lnT w="12700" cmpd="sng">
+                      <a:noFill/>
+                    </a:lnT>
+                    <a:lnB w="12700" cmpd="sng">
+                      <a:noFill/>
+                    </a:lnB>
+                    <a:lnTlToBr w="12700" cmpd="sng">
+                      <a:noFill/>
+                      <a:prstDash val="solid"/>
+                    </a:lnTlToBr>
+                    <a:lnBlToTr w="12700" cmpd="sng">
+                      <a:noFill/>
+                      <a:prstDash val="solid"/>
+                    </a:lnBlToTr>
+                  </a:tcPr>
+                </a:tc>
+                <a:tc>
+                  <a:txBody>
+                    <a:bodyPr/>
+                    <a:lstStyle/>
+                    <a:p>
+                      <a:pPr algn="ctr"/>
+                      <a:r>
+                        <a:rPr lang="en-US" dirty="0" smtClean="0">
+                          <a:solidFill>
+                            <a:srgbClr val="00B050"/>
+                          </a:solidFill>
+                        </a:rPr>
+                        <a:t>Yes</a:t>
+                      </a:r>
+                      <a:endParaRPr lang="en-US" dirty="0"/>
+                    </a:p>
+                  </a:txBody>
+                  <a:tcPr>
+                    <a:lnL w="12700" cmpd="sng">
+                      <a:noFill/>
+                    </a:lnL>
+                    <a:lnR w="12700" cmpd="sng">
+                      <a:noFill/>
+                    </a:lnR>
+                    <a:lnT w="12700" cmpd="sng">
+                      <a:noFill/>
+                    </a:lnT>
+                    <a:lnB w="12700" cmpd="sng">
+                      <a:noFill/>
+                    </a:lnB>
+                    <a:lnTlToBr w="12700" cmpd="sng">
+                      <a:noFill/>
+                      <a:prstDash val="solid"/>
+                    </a:lnTlToBr>
+                    <a:lnBlToTr w="12700" cmpd="sng">
+                      <a:noFill/>
+                      <a:prstDash val="solid"/>
+                    </a:lnBlToTr>
+                  </a:tcPr>
+                </a:tc>
+              </a:tr>
+            </a:tbl>
+          </a:graphicData>
+        </a:graphic>
+      </p:graphicFrame>
     </p:spTree>
     <p:extLst>
       <p:ext uri="{BB962C8B-B14F-4D97-AF65-F5344CB8AC3E}">
-        <p14:creationId xmlns:p14="http://schemas.microsoft.com/office/powerpoint/2010/main" val="111047193"/>
+        <p14:creationId xmlns:p14="http://schemas.microsoft.com/office/powerpoint/2010/main" val="363065889"/>
       </p:ext>
     </p:extLst>
   </p:cSld>
@@ -12116,6 +13647,209 @@
 </file>
 
 <file path=ppt/slides/slide7.xml><?xml version="1.0" encoding="utf-8"?>
+<p:sld xmlns:a="http://schemas.openxmlformats.org/drawingml/2006/main" xmlns:r="http://schemas.openxmlformats.org/officeDocument/2006/relationships" xmlns:p="http://schemas.openxmlformats.org/presentationml/2006/main">
+  <p:cSld>
+    <p:spTree>
+      <p:nvGrpSpPr>
+        <p:cNvPr id="1" name=""/>
+        <p:cNvGrpSpPr/>
+        <p:nvPr/>
+      </p:nvGrpSpPr>
+      <p:grpSpPr>
+        <a:xfrm>
+          <a:off x="0" y="0"/>
+          <a:ext cx="0" cy="0"/>
+          <a:chOff x="0" y="0"/>
+          <a:chExt cx="0" cy="0"/>
+        </a:xfrm>
+      </p:grpSpPr>
+      <p:sp>
+        <p:nvSpPr>
+          <p:cNvPr id="2" name="Title 1"/>
+          <p:cNvSpPr>
+            <a:spLocks noGrp="1"/>
+          </p:cNvSpPr>
+          <p:nvPr>
+            <p:ph type="title"/>
+          </p:nvPr>
+        </p:nvSpPr>
+        <p:spPr/>
+        <p:txBody>
+          <a:bodyPr/>
+          <a:lstStyle/>
+          <a:p>
+            <a:pPr algn="r"/>
+            <a:r>
+              <a:rPr lang="en-US" dirty="0"/>
+              <a:t>Property Monitoring Kit: Demo</a:t>
+            </a:r>
+          </a:p>
+        </p:txBody>
+      </p:sp>
+      <p:sp>
+        <p:nvSpPr>
+          <p:cNvPr id="5" name="Footer Placeholder 3"/>
+          <p:cNvSpPr txBox="1">
+            <a:spLocks/>
+          </p:cNvSpPr>
+          <p:nvPr/>
+        </p:nvSpPr>
+        <p:spPr>
+          <a:xfrm>
+            <a:off x="2741612" y="6473736"/>
+            <a:ext cx="7619999" cy="365125"/>
+          </a:xfrm>
+          <a:prstGeom prst="rect">
+            <a:avLst/>
+          </a:prstGeom>
+        </p:spPr>
+        <p:txBody>
+          <a:bodyPr vert="horz" lIns="91440" tIns="45720" rIns="91440" bIns="45720" rtlCol="0" anchor="ctr"/>
+          <a:lstStyle>
+            <a:defPPr>
+              <a:defRPr lang="en-US"/>
+            </a:defPPr>
+            <a:lvl1pPr marL="0" algn="l" defTabSz="914400" rtl="0" eaLnBrk="1" latinLnBrk="0" hangingPunct="1">
+              <a:defRPr sz="900" kern="1200">
+                <a:solidFill>
+                  <a:schemeClr val="tx1">
+                    <a:tint val="75000"/>
+                  </a:schemeClr>
+                </a:solidFill>
+                <a:latin typeface="+mn-lt"/>
+                <a:ea typeface="+mn-ea"/>
+                <a:cs typeface="+mn-cs"/>
+              </a:defRPr>
+            </a:lvl1pPr>
+            <a:lvl2pPr marL="457200" algn="l" defTabSz="914400" rtl="0" eaLnBrk="1" latinLnBrk="0" hangingPunct="1">
+              <a:defRPr sz="1800" kern="1200">
+                <a:solidFill>
+                  <a:schemeClr val="tx1"/>
+                </a:solidFill>
+                <a:latin typeface="+mn-lt"/>
+                <a:ea typeface="+mn-ea"/>
+                <a:cs typeface="+mn-cs"/>
+              </a:defRPr>
+            </a:lvl2pPr>
+            <a:lvl3pPr marL="914400" algn="l" defTabSz="914400" rtl="0" eaLnBrk="1" latinLnBrk="0" hangingPunct="1">
+              <a:defRPr sz="1800" kern="1200">
+                <a:solidFill>
+                  <a:schemeClr val="tx1"/>
+                </a:solidFill>
+                <a:latin typeface="+mn-lt"/>
+                <a:ea typeface="+mn-ea"/>
+                <a:cs typeface="+mn-cs"/>
+              </a:defRPr>
+            </a:lvl3pPr>
+            <a:lvl4pPr marL="1371600" algn="l" defTabSz="914400" rtl="0" eaLnBrk="1" latinLnBrk="0" hangingPunct="1">
+              <a:defRPr sz="1800" kern="1200">
+                <a:solidFill>
+                  <a:schemeClr val="tx1"/>
+                </a:solidFill>
+                <a:latin typeface="+mn-lt"/>
+                <a:ea typeface="+mn-ea"/>
+                <a:cs typeface="+mn-cs"/>
+              </a:defRPr>
+            </a:lvl4pPr>
+            <a:lvl5pPr marL="1828800" algn="l" defTabSz="914400" rtl="0" eaLnBrk="1" latinLnBrk="0" hangingPunct="1">
+              <a:defRPr sz="1800" kern="1200">
+                <a:solidFill>
+                  <a:schemeClr val="tx1"/>
+                </a:solidFill>
+                <a:latin typeface="+mn-lt"/>
+                <a:ea typeface="+mn-ea"/>
+                <a:cs typeface="+mn-cs"/>
+              </a:defRPr>
+            </a:lvl5pPr>
+            <a:lvl6pPr marL="2286000" algn="l" defTabSz="914400" rtl="0" eaLnBrk="1" latinLnBrk="0" hangingPunct="1">
+              <a:defRPr sz="1800" kern="1200">
+                <a:solidFill>
+                  <a:schemeClr val="tx1"/>
+                </a:solidFill>
+                <a:latin typeface="+mn-lt"/>
+                <a:ea typeface="+mn-ea"/>
+                <a:cs typeface="+mn-cs"/>
+              </a:defRPr>
+            </a:lvl6pPr>
+            <a:lvl7pPr marL="2743200" algn="l" defTabSz="914400" rtl="0" eaLnBrk="1" latinLnBrk="0" hangingPunct="1">
+              <a:defRPr sz="1800" kern="1200">
+                <a:solidFill>
+                  <a:schemeClr val="tx1"/>
+                </a:solidFill>
+                <a:latin typeface="+mn-lt"/>
+                <a:ea typeface="+mn-ea"/>
+                <a:cs typeface="+mn-cs"/>
+              </a:defRPr>
+            </a:lvl7pPr>
+            <a:lvl8pPr marL="3200400" algn="l" defTabSz="914400" rtl="0" eaLnBrk="1" latinLnBrk="0" hangingPunct="1">
+              <a:defRPr sz="1800" kern="1200">
+                <a:solidFill>
+                  <a:schemeClr val="tx1"/>
+                </a:solidFill>
+                <a:latin typeface="+mn-lt"/>
+                <a:ea typeface="+mn-ea"/>
+                <a:cs typeface="+mn-cs"/>
+              </a:defRPr>
+            </a:lvl8pPr>
+            <a:lvl9pPr marL="3657600" algn="l" defTabSz="914400" rtl="0" eaLnBrk="1" latinLnBrk="0" hangingPunct="1">
+              <a:defRPr sz="1800" kern="1200">
+                <a:solidFill>
+                  <a:schemeClr val="tx1"/>
+                </a:solidFill>
+                <a:latin typeface="+mn-lt"/>
+                <a:ea typeface="+mn-ea"/>
+                <a:cs typeface="+mn-cs"/>
+              </a:defRPr>
+            </a:lvl9pPr>
+          </a:lstStyle>
+          <a:p>
+            <a:r>
+              <a:rPr lang="en-US" dirty="0">
+                <a:solidFill>
+                  <a:schemeClr val="bg1">
+                    <a:lumMod val="65000"/>
+                  </a:schemeClr>
+                </a:solidFill>
+              </a:rPr>
+              <a:t>Innovation Day | August 23</a:t>
+            </a:r>
+            <a:r>
+              <a:rPr lang="en-US" baseline="30000" dirty="0">
+                <a:solidFill>
+                  <a:schemeClr val="bg1">
+                    <a:lumMod val="65000"/>
+                  </a:schemeClr>
+                </a:solidFill>
+              </a:rPr>
+              <a:t>rd</a:t>
+            </a:r>
+            <a:r>
+              <a:rPr lang="en-US" dirty="0">
+                <a:solidFill>
+                  <a:schemeClr val="bg1">
+                    <a:lumMod val="65000"/>
+                  </a:schemeClr>
+                </a:solidFill>
+              </a:rPr>
+              <a:t> 2018</a:t>
+            </a:r>
+          </a:p>
+        </p:txBody>
+      </p:sp>
+    </p:spTree>
+    <p:extLst>
+      <p:ext uri="{BB962C8B-B14F-4D97-AF65-F5344CB8AC3E}">
+        <p14:creationId xmlns:p14="http://schemas.microsoft.com/office/powerpoint/2010/main" val="4054829181"/>
+      </p:ext>
+    </p:extLst>
+  </p:cSld>
+  <p:clrMapOvr>
+    <a:masterClrMapping/>
+  </p:clrMapOvr>
+</p:sld>
+</file>
+
+<file path=ppt/slides/slide8.xml><?xml version="1.0" encoding="utf-8"?>
 <p:sld xmlns:a="http://schemas.openxmlformats.org/drawingml/2006/main" xmlns:r="http://schemas.openxmlformats.org/officeDocument/2006/relationships" xmlns:p="http://schemas.openxmlformats.org/presentationml/2006/main">
   <p:cSld>
     <p:spTree>
@@ -12262,7 +13996,7 @@
 </p:sld>
 </file>
 
-<file path=ppt/slides/slide8.xml><?xml version="1.0" encoding="utf-8"?>
+<file path=ppt/slides/slide9.xml><?xml version="1.0" encoding="utf-8"?>
 <p:sld xmlns:a="http://schemas.openxmlformats.org/drawingml/2006/main" xmlns:r="http://schemas.openxmlformats.org/officeDocument/2006/relationships" xmlns:p="http://schemas.openxmlformats.org/presentationml/2006/main">
   <p:cSld>
     <p:spTree>
@@ -12485,238 +14219,6 @@
     <p:extLst>
       <p:ext uri="{BB962C8B-B14F-4D97-AF65-F5344CB8AC3E}">
         <p14:creationId xmlns:p14="http://schemas.microsoft.com/office/powerpoint/2010/main" val="3263627320"/>
-      </p:ext>
-    </p:extLst>
-  </p:cSld>
-  <p:clrMapOvr>
-    <a:masterClrMapping/>
-  </p:clrMapOvr>
-</p:sld>
-</file>
-
-<file path=ppt/slides/slide9.xml><?xml version="1.0" encoding="utf-8"?>
-<p:sld xmlns:a="http://schemas.openxmlformats.org/drawingml/2006/main" xmlns:r="http://schemas.openxmlformats.org/officeDocument/2006/relationships" xmlns:p="http://schemas.openxmlformats.org/presentationml/2006/main">
-  <p:cSld>
-    <p:spTree>
-      <p:nvGrpSpPr>
-        <p:cNvPr id="1" name=""/>
-        <p:cNvGrpSpPr/>
-        <p:nvPr/>
-      </p:nvGrpSpPr>
-      <p:grpSpPr>
-        <a:xfrm>
-          <a:off x="0" y="0"/>
-          <a:ext cx="0" cy="0"/>
-          <a:chOff x="0" y="0"/>
-          <a:chExt cx="0" cy="0"/>
-        </a:xfrm>
-      </p:grpSpPr>
-      <p:sp>
-        <p:nvSpPr>
-          <p:cNvPr id="2" name="Title 1"/>
-          <p:cNvSpPr>
-            <a:spLocks noGrp="1"/>
-          </p:cNvSpPr>
-          <p:nvPr>
-            <p:ph type="title"/>
-          </p:nvPr>
-        </p:nvSpPr>
-        <p:spPr/>
-        <p:txBody>
-          <a:bodyPr/>
-          <a:lstStyle/>
-          <a:p>
-            <a:pPr algn="r"/>
-            <a:r>
-              <a:rPr lang="en-US" dirty="0"/>
-              <a:t>Appendix 2: Arduino Kit Cost </a:t>
-            </a:r>
-          </a:p>
-        </p:txBody>
-      </p:sp>
-      <p:sp>
-        <p:nvSpPr>
-          <p:cNvPr id="5" name="Footer Placeholder 3"/>
-          <p:cNvSpPr txBox="1">
-            <a:spLocks/>
-          </p:cNvSpPr>
-          <p:nvPr/>
-        </p:nvSpPr>
-        <p:spPr>
-          <a:xfrm>
-            <a:off x="2741612" y="6473736"/>
-            <a:ext cx="7619999" cy="365125"/>
-          </a:xfrm>
-          <a:prstGeom prst="rect">
-            <a:avLst/>
-          </a:prstGeom>
-        </p:spPr>
-        <p:txBody>
-          <a:bodyPr vert="horz" lIns="91440" tIns="45720" rIns="91440" bIns="45720" rtlCol="0" anchor="ctr"/>
-          <a:lstStyle>
-            <a:defPPr>
-              <a:defRPr lang="en-US"/>
-            </a:defPPr>
-            <a:lvl1pPr marL="0" algn="l" defTabSz="914400" rtl="0" eaLnBrk="1" latinLnBrk="0" hangingPunct="1">
-              <a:defRPr sz="900" kern="1200">
-                <a:solidFill>
-                  <a:schemeClr val="tx1">
-                    <a:tint val="75000"/>
-                  </a:schemeClr>
-                </a:solidFill>
-                <a:latin typeface="+mn-lt"/>
-                <a:ea typeface="+mn-ea"/>
-                <a:cs typeface="+mn-cs"/>
-              </a:defRPr>
-            </a:lvl1pPr>
-            <a:lvl2pPr marL="457200" algn="l" defTabSz="914400" rtl="0" eaLnBrk="1" latinLnBrk="0" hangingPunct="1">
-              <a:defRPr sz="1800" kern="1200">
-                <a:solidFill>
-                  <a:schemeClr val="tx1"/>
-                </a:solidFill>
-                <a:latin typeface="+mn-lt"/>
-                <a:ea typeface="+mn-ea"/>
-                <a:cs typeface="+mn-cs"/>
-              </a:defRPr>
-            </a:lvl2pPr>
-            <a:lvl3pPr marL="914400" algn="l" defTabSz="914400" rtl="0" eaLnBrk="1" latinLnBrk="0" hangingPunct="1">
-              <a:defRPr sz="1800" kern="1200">
-                <a:solidFill>
-                  <a:schemeClr val="tx1"/>
-                </a:solidFill>
-                <a:latin typeface="+mn-lt"/>
-                <a:ea typeface="+mn-ea"/>
-                <a:cs typeface="+mn-cs"/>
-              </a:defRPr>
-            </a:lvl3pPr>
-            <a:lvl4pPr marL="1371600" algn="l" defTabSz="914400" rtl="0" eaLnBrk="1" latinLnBrk="0" hangingPunct="1">
-              <a:defRPr sz="1800" kern="1200">
-                <a:solidFill>
-                  <a:schemeClr val="tx1"/>
-                </a:solidFill>
-                <a:latin typeface="+mn-lt"/>
-                <a:ea typeface="+mn-ea"/>
-                <a:cs typeface="+mn-cs"/>
-              </a:defRPr>
-            </a:lvl4pPr>
-            <a:lvl5pPr marL="1828800" algn="l" defTabSz="914400" rtl="0" eaLnBrk="1" latinLnBrk="0" hangingPunct="1">
-              <a:defRPr sz="1800" kern="1200">
-                <a:solidFill>
-                  <a:schemeClr val="tx1"/>
-                </a:solidFill>
-                <a:latin typeface="+mn-lt"/>
-                <a:ea typeface="+mn-ea"/>
-                <a:cs typeface="+mn-cs"/>
-              </a:defRPr>
-            </a:lvl5pPr>
-            <a:lvl6pPr marL="2286000" algn="l" defTabSz="914400" rtl="0" eaLnBrk="1" latinLnBrk="0" hangingPunct="1">
-              <a:defRPr sz="1800" kern="1200">
-                <a:solidFill>
-                  <a:schemeClr val="tx1"/>
-                </a:solidFill>
-                <a:latin typeface="+mn-lt"/>
-                <a:ea typeface="+mn-ea"/>
-                <a:cs typeface="+mn-cs"/>
-              </a:defRPr>
-            </a:lvl6pPr>
-            <a:lvl7pPr marL="2743200" algn="l" defTabSz="914400" rtl="0" eaLnBrk="1" latinLnBrk="0" hangingPunct="1">
-              <a:defRPr sz="1800" kern="1200">
-                <a:solidFill>
-                  <a:schemeClr val="tx1"/>
-                </a:solidFill>
-                <a:latin typeface="+mn-lt"/>
-                <a:ea typeface="+mn-ea"/>
-                <a:cs typeface="+mn-cs"/>
-              </a:defRPr>
-            </a:lvl7pPr>
-            <a:lvl8pPr marL="3200400" algn="l" defTabSz="914400" rtl="0" eaLnBrk="1" latinLnBrk="0" hangingPunct="1">
-              <a:defRPr sz="1800" kern="1200">
-                <a:solidFill>
-                  <a:schemeClr val="tx1"/>
-                </a:solidFill>
-                <a:latin typeface="+mn-lt"/>
-                <a:ea typeface="+mn-ea"/>
-                <a:cs typeface="+mn-cs"/>
-              </a:defRPr>
-            </a:lvl8pPr>
-            <a:lvl9pPr marL="3657600" algn="l" defTabSz="914400" rtl="0" eaLnBrk="1" latinLnBrk="0" hangingPunct="1">
-              <a:defRPr sz="1800" kern="1200">
-                <a:solidFill>
-                  <a:schemeClr val="tx1"/>
-                </a:solidFill>
-                <a:latin typeface="+mn-lt"/>
-                <a:ea typeface="+mn-ea"/>
-                <a:cs typeface="+mn-cs"/>
-              </a:defRPr>
-            </a:lvl9pPr>
-          </a:lstStyle>
-          <a:p>
-            <a:r>
-              <a:rPr lang="en-US" dirty="0">
-                <a:solidFill>
-                  <a:schemeClr val="bg1">
-                    <a:lumMod val="65000"/>
-                  </a:schemeClr>
-                </a:solidFill>
-              </a:rPr>
-              <a:t>Innovation Day | August 23</a:t>
-            </a:r>
-            <a:r>
-              <a:rPr lang="en-US" baseline="30000" dirty="0">
-                <a:solidFill>
-                  <a:schemeClr val="bg1">
-                    <a:lumMod val="65000"/>
-                  </a:schemeClr>
-                </a:solidFill>
-              </a:rPr>
-              <a:t>rd</a:t>
-            </a:r>
-            <a:r>
-              <a:rPr lang="en-US" dirty="0">
-                <a:solidFill>
-                  <a:schemeClr val="bg1">
-                    <a:lumMod val="65000"/>
-                  </a:schemeClr>
-                </a:solidFill>
-              </a:rPr>
-              <a:t> 2018</a:t>
-            </a:r>
-          </a:p>
-        </p:txBody>
-      </p:sp>
-      <p:pic>
-        <p:nvPicPr>
-          <p:cNvPr id="3" name="Content Placeholder 2"/>
-          <p:cNvPicPr>
-            <a:picLocks noGrp="1" noChangeAspect="1"/>
-          </p:cNvPicPr>
-          <p:nvPr>
-            <p:ph idx="1"/>
-          </p:nvPr>
-        </p:nvPicPr>
-        <p:blipFill>
-          <a:blip r:embed="rId2">
-            <a:extLst>
-              <a:ext uri="{28A0092B-C50C-407E-A947-70E740481C1C}">
-                <a14:useLocalDpi xmlns:a14="http://schemas.microsoft.com/office/drawing/2010/main" val="0"/>
-              </a:ext>
-            </a:extLst>
-          </a:blip>
-          <a:stretch>
-            <a:fillRect/>
-          </a:stretch>
-        </p:blipFill>
-        <p:spPr>
-          <a:xfrm>
-            <a:off x="2798379" y="1622631"/>
-            <a:ext cx="8706233" cy="4918347"/>
-          </a:xfrm>
-        </p:spPr>
-      </p:pic>
-    </p:spTree>
-    <p:extLst>
-      <p:ext uri="{BB962C8B-B14F-4D97-AF65-F5344CB8AC3E}">
-        <p14:creationId xmlns:p14="http://schemas.microsoft.com/office/powerpoint/2010/main" val="3643360109"/>
       </p:ext>
     </p:extLst>
   </p:cSld>

</xml_diff>